<commit_message>
Further improve UI: - Trainer-view now validates input for variable values - scenario design view now no longer shows duplicate entries
Some refactoring of templates and domain layer
</commit_message>
<xml_diff>
--- a/artefacts/Evaluation/Evaluation Info Letter.pptx
+++ b/artefacts/Evaluation/Evaluation Info Letter.pptx
@@ -278,7 +278,7 @@
           <a:p>
             <a:fld id="{7041A1A4-18FB-431C-AC6C-289EA8653A03}" type="datetimeFigureOut">
               <a:rPr lang="de-DE" smtClean="0"/>
-              <a:t>29.09.2021</a:t>
+              <a:t>05.10.2021</a:t>
             </a:fld>
             <a:endParaRPr lang="de-DE"/>
           </a:p>
@@ -907,7 +907,7 @@
           <a:p>
             <a:fld id="{7041A1A4-18FB-431C-AC6C-289EA8653A03}" type="datetimeFigureOut">
               <a:rPr lang="de-DE" smtClean="0"/>
-              <a:t>29.09.2021</a:t>
+              <a:t>05.10.2021</a:t>
             </a:fld>
             <a:endParaRPr lang="de-DE"/>
           </a:p>
@@ -1095,7 +1095,7 @@
           <a:p>
             <a:fld id="{7041A1A4-18FB-431C-AC6C-289EA8653A03}" type="datetimeFigureOut">
               <a:rPr lang="de-DE" smtClean="0"/>
-              <a:t>29.09.2021</a:t>
+              <a:t>05.10.2021</a:t>
             </a:fld>
             <a:endParaRPr lang="de-DE"/>
           </a:p>
@@ -1307,7 +1307,7 @@
           <a:p>
             <a:fld id="{7041A1A4-18FB-431C-AC6C-289EA8653A03}" type="datetimeFigureOut">
               <a:rPr lang="de-DE" smtClean="0"/>
-              <a:t>29.09.2021</a:t>
+              <a:t>05.10.2021</a:t>
             </a:fld>
             <a:endParaRPr lang="de-DE"/>
           </a:p>
@@ -1559,7 +1559,7 @@
           <a:p>
             <a:fld id="{7041A1A4-18FB-431C-AC6C-289EA8653A03}" type="datetimeFigureOut">
               <a:rPr lang="de-DE" smtClean="0"/>
-              <a:t>29.09.2021</a:t>
+              <a:t>05.10.2021</a:t>
             </a:fld>
             <a:endParaRPr lang="de-DE"/>
           </a:p>
@@ -1799,7 +1799,7 @@
           <a:p>
             <a:fld id="{7041A1A4-18FB-431C-AC6C-289EA8653A03}" type="datetimeFigureOut">
               <a:rPr lang="de-DE" smtClean="0"/>
-              <a:t>29.09.2021</a:t>
+              <a:t>05.10.2021</a:t>
             </a:fld>
             <a:endParaRPr lang="de-DE"/>
           </a:p>
@@ -2174,7 +2174,7 @@
           <a:p>
             <a:fld id="{7041A1A4-18FB-431C-AC6C-289EA8653A03}" type="datetimeFigureOut">
               <a:rPr lang="de-DE" smtClean="0"/>
-              <a:t>29.09.2021</a:t>
+              <a:t>05.10.2021</a:t>
             </a:fld>
             <a:endParaRPr lang="de-DE"/>
           </a:p>
@@ -2300,7 +2300,7 @@
           <a:p>
             <a:fld id="{7041A1A4-18FB-431C-AC6C-289EA8653A03}" type="datetimeFigureOut">
               <a:rPr lang="de-DE" smtClean="0"/>
-              <a:t>29.09.2021</a:t>
+              <a:t>05.10.2021</a:t>
             </a:fld>
             <a:endParaRPr lang="de-DE"/>
           </a:p>
@@ -2403,7 +2403,7 @@
           <a:p>
             <a:fld id="{7041A1A4-18FB-431C-AC6C-289EA8653A03}" type="datetimeFigureOut">
               <a:rPr lang="de-DE" smtClean="0"/>
-              <a:t>29.09.2021</a:t>
+              <a:t>05.10.2021</a:t>
             </a:fld>
             <a:endParaRPr lang="de-DE"/>
           </a:p>
@@ -2688,7 +2688,7 @@
           <a:p>
             <a:fld id="{7041A1A4-18FB-431C-AC6C-289EA8653A03}" type="datetimeFigureOut">
               <a:rPr lang="de-DE" smtClean="0"/>
-              <a:t>29.09.2021</a:t>
+              <a:t>05.10.2021</a:t>
             </a:fld>
             <a:endParaRPr lang="de-DE"/>
           </a:p>
@@ -2953,7 +2953,7 @@
           <a:p>
             <a:fld id="{7041A1A4-18FB-431C-AC6C-289EA8653A03}" type="datetimeFigureOut">
               <a:rPr lang="de-DE" smtClean="0"/>
-              <a:t>29.09.2021</a:t>
+              <a:t>05.10.2021</a:t>
             </a:fld>
             <a:endParaRPr lang="de-DE"/>
           </a:p>
@@ -21562,6 +21562,11 @@
               </a:rPr>
               <a:t> </a:t>
             </a:r>
+          </a:p>
+          <a:p>
+            <a:pPr marL="0" indent="0">
+              <a:buNone/>
+            </a:pPr>
             <a:r>
               <a:rPr lang="de-DE" dirty="0" err="1">
                 <a:latin typeface="Bahnschrift" panose="020B0502040204020203" pitchFamily="34" charset="0"/>
@@ -21578,6 +21583,18 @@
               <a:rPr lang="de-DE" dirty="0" err="1">
                 <a:latin typeface="Bahnschrift" panose="020B0502040204020203" pitchFamily="34" charset="0"/>
               </a:rPr>
+              <a:t>then</a:t>
+            </a:r>
+            <a:r>
+              <a:rPr lang="de-DE" dirty="0">
+                <a:latin typeface="Bahnschrift" panose="020B0502040204020203" pitchFamily="34" charset="0"/>
+              </a:rPr>
+              <a:t> </a:t>
+            </a:r>
+            <a:r>
+              <a:rPr lang="de-DE" dirty="0" err="1">
+                <a:latin typeface="Bahnschrift" panose="020B0502040204020203" pitchFamily="34" charset="0"/>
+              </a:rPr>
               <a:t>add</a:t>
             </a:r>
             <a:r>
@@ -21754,14 +21771,26 @@
               <a:rPr lang="de-DE" dirty="0">
                 <a:latin typeface="Bahnschrift" panose="020B0502040204020203" pitchFamily="34" charset="0"/>
               </a:rPr>
-              <a:t> 20,000€,</a:t>
-            </a:r>
-          </a:p>
-          <a:p>
+              <a:t> </a:t>
+            </a:r>
             <a:r>
               <a:rPr lang="de-DE" i="1" dirty="0">
                 <a:latin typeface="Bahnschrift" panose="020B0502040204020203" pitchFamily="34" charset="0"/>
               </a:rPr>
+              <a:t>20,000</a:t>
+            </a:r>
+            <a:r>
+              <a:rPr lang="de-DE" dirty="0">
+                <a:latin typeface="Bahnschrift" panose="020B0502040204020203" pitchFamily="34" charset="0"/>
+              </a:rPr>
+              <a:t>€,</a:t>
+            </a:r>
+          </a:p>
+          <a:p>
+            <a:r>
+              <a:rPr lang="de-DE" i="1" dirty="0">
+                <a:latin typeface="Bahnschrift" panose="020B0502040204020203" pitchFamily="34" charset="0"/>
+              </a:rPr>
               <a:t>Time (</a:t>
             </a:r>
             <a:r>
@@ -21900,7 +21929,19 @@
               <a:rPr lang="de-DE" dirty="0">
                 <a:latin typeface="Bahnschrift" panose="020B0502040204020203" pitchFamily="34" charset="0"/>
               </a:rPr>
-              <a:t> 5 and</a:t>
+              <a:t> </a:t>
+            </a:r>
+            <a:r>
+              <a:rPr lang="de-DE" i="1" dirty="0">
+                <a:latin typeface="Bahnschrift" panose="020B0502040204020203" pitchFamily="34" charset="0"/>
+              </a:rPr>
+              <a:t>5</a:t>
+            </a:r>
+            <a:r>
+              <a:rPr lang="de-DE" dirty="0">
+                <a:latin typeface="Bahnschrift" panose="020B0502040204020203" pitchFamily="34" charset="0"/>
+              </a:rPr>
+              <a:t> and</a:t>
             </a:r>
           </a:p>
           <a:p>
@@ -22113,7 +22154,7 @@
               <a:rPr lang="de-DE" sz="1200" dirty="0" err="1">
                 <a:latin typeface="Bahnschrift" panose="020B0502040204020203" pitchFamily="34" charset="0"/>
               </a:rPr>
-              <a:t>four</a:t>
+              <a:t>three</a:t>
             </a:r>
             <a:r>
               <a:rPr lang="de-DE" sz="1200" dirty="0">
@@ -22125,7 +22166,7 @@
               <a:rPr lang="de-DE" dirty="0" err="1">
                 <a:latin typeface="Bahnschrift" panose="020B0502040204020203" pitchFamily="34" charset="0"/>
               </a:rPr>
-              <a:t>scenarios</a:t>
+              <a:t>injects</a:t>
             </a:r>
             <a:r>
               <a:rPr lang="de-DE" dirty="0">
@@ -22206,214 +22247,256 @@
               <a:t> </a:t>
             </a:r>
             <a:r>
+              <a:rPr lang="de-DE" i="1" dirty="0">
+                <a:latin typeface="Bahnschrift" panose="020B0502040204020203" pitchFamily="34" charset="0"/>
+              </a:rPr>
+              <a:t>Budget </a:t>
+            </a:r>
+            <a:r>
               <a:rPr lang="de-DE" i="1" dirty="0" err="1">
                 <a:latin typeface="Bahnschrift" panose="020B0502040204020203" pitchFamily="34" charset="0"/>
               </a:rPr>
-              <a:t>budget</a:t>
+              <a:t>Choices</a:t>
+            </a:r>
+            <a:r>
+              <a:rPr lang="de-DE" dirty="0">
+                <a:latin typeface="Bahnschrift" panose="020B0502040204020203" pitchFamily="34" charset="0"/>
+              </a:rPr>
+              <a:t>, </a:t>
             </a:r>
             <a:r>
               <a:rPr lang="de-DE" i="1" dirty="0">
                 <a:latin typeface="Bahnschrift" panose="020B0502040204020203" pitchFamily="34" charset="0"/>
               </a:rPr>
-              <a:t> </a:t>
+              <a:t>Budget Evaluation </a:t>
+            </a:r>
+            <a:r>
+              <a:rPr lang="de-DE" dirty="0">
+                <a:latin typeface="Bahnschrift" panose="020B0502040204020203" pitchFamily="34" charset="0"/>
+              </a:rPr>
+              <a:t>and </a:t>
+            </a:r>
+            <a:r>
+              <a:rPr lang="de-DE" i="1" dirty="0">
+                <a:latin typeface="Bahnschrift" panose="020B0502040204020203" pitchFamily="34" charset="0"/>
+              </a:rPr>
+              <a:t>Final Report</a:t>
+            </a:r>
+            <a:r>
+              <a:rPr lang="de-DE" dirty="0">
+                <a:latin typeface="Bahnschrift" panose="020B0502040204020203" pitchFamily="34" charset="0"/>
+              </a:rPr>
+              <a:t>. </a:t>
+            </a:r>
+            <a:r>
+              <a:rPr lang="de-DE" dirty="0" err="1">
+                <a:latin typeface="Bahnschrift" panose="020B0502040204020203" pitchFamily="34" charset="0"/>
+              </a:rPr>
+              <a:t>Make</a:t>
+            </a:r>
+            <a:r>
+              <a:rPr lang="de-DE" dirty="0">
+                <a:latin typeface="Bahnschrift" panose="020B0502040204020203" pitchFamily="34" charset="0"/>
+              </a:rPr>
+              <a:t> </a:t>
+            </a:r>
+            <a:r>
+              <a:rPr lang="de-DE" dirty="0" err="1">
+                <a:latin typeface="Bahnschrift" panose="020B0502040204020203" pitchFamily="34" charset="0"/>
+              </a:rPr>
+              <a:t>sure</a:t>
+            </a:r>
+            <a:r>
+              <a:rPr lang="de-DE" dirty="0">
+                <a:latin typeface="Bahnschrift" panose="020B0502040204020203" pitchFamily="34" charset="0"/>
+              </a:rPr>
+              <a:t> </a:t>
+            </a:r>
+            <a:r>
+              <a:rPr lang="de-DE" dirty="0" err="1">
+                <a:latin typeface="Bahnschrift" panose="020B0502040204020203" pitchFamily="34" charset="0"/>
+              </a:rPr>
+              <a:t>to</a:t>
+            </a:r>
+            <a:r>
+              <a:rPr lang="de-DE" dirty="0">
+                <a:latin typeface="Bahnschrift" panose="020B0502040204020203" pitchFamily="34" charset="0"/>
+              </a:rPr>
+              <a:t> also </a:t>
+            </a:r>
+            <a:r>
+              <a:rPr lang="de-DE" dirty="0" err="1">
+                <a:latin typeface="Bahnschrift" panose="020B0502040204020203" pitchFamily="34" charset="0"/>
+              </a:rPr>
+              <a:t>add</a:t>
+            </a:r>
+            <a:r>
+              <a:rPr lang="de-DE" dirty="0">
+                <a:latin typeface="Bahnschrift" panose="020B0502040204020203" pitchFamily="34" charset="0"/>
+              </a:rPr>
+              <a:t> a </a:t>
+            </a:r>
+            <a:r>
+              <a:rPr lang="de-DE" dirty="0" err="1">
+                <a:latin typeface="Bahnschrift" panose="020B0502040204020203" pitchFamily="34" charset="0"/>
+              </a:rPr>
+              <a:t>short</a:t>
+            </a:r>
+            <a:r>
+              <a:rPr lang="de-DE" dirty="0">
+                <a:latin typeface="Bahnschrift" panose="020B0502040204020203" pitchFamily="34" charset="0"/>
+              </a:rPr>
+              <a:t> </a:t>
+            </a:r>
+            <a:r>
+              <a:rPr lang="de-DE" dirty="0" err="1">
+                <a:latin typeface="Bahnschrift" panose="020B0502040204020203" pitchFamily="34" charset="0"/>
+              </a:rPr>
+              <a:t>text</a:t>
+            </a:r>
+            <a:r>
+              <a:rPr lang="de-DE" dirty="0">
+                <a:latin typeface="Bahnschrift" panose="020B0502040204020203" pitchFamily="34" charset="0"/>
+              </a:rPr>
+              <a:t> </a:t>
+            </a:r>
+            <a:r>
+              <a:rPr lang="de-DE" dirty="0" err="1">
+                <a:latin typeface="Bahnschrift" panose="020B0502040204020203" pitchFamily="34" charset="0"/>
+              </a:rPr>
+              <a:t>for</a:t>
+            </a:r>
+            <a:r>
+              <a:rPr lang="de-DE" dirty="0">
+                <a:latin typeface="Bahnschrift" panose="020B0502040204020203" pitchFamily="34" charset="0"/>
+              </a:rPr>
+              <a:t> </a:t>
+            </a:r>
+            <a:r>
+              <a:rPr lang="de-DE" dirty="0" err="1">
+                <a:latin typeface="Bahnschrift" panose="020B0502040204020203" pitchFamily="34" charset="0"/>
+              </a:rPr>
+              <a:t>the</a:t>
+            </a:r>
+            <a:r>
+              <a:rPr lang="de-DE" dirty="0">
+                <a:latin typeface="Bahnschrift" panose="020B0502040204020203" pitchFamily="34" charset="0"/>
+              </a:rPr>
+              <a:t> </a:t>
+            </a:r>
+            <a:r>
+              <a:rPr lang="de-DE" dirty="0" err="1">
+                <a:latin typeface="Bahnschrift" panose="020B0502040204020203" pitchFamily="34" charset="0"/>
+              </a:rPr>
+              <a:t>description</a:t>
+            </a:r>
+            <a:r>
+              <a:rPr lang="de-DE" dirty="0">
+                <a:latin typeface="Bahnschrift" panose="020B0502040204020203" pitchFamily="34" charset="0"/>
+              </a:rPr>
+              <a:t>. The </a:t>
+            </a:r>
+            <a:r>
+              <a:rPr lang="de-DE" dirty="0" err="1">
+                <a:latin typeface="Bahnschrift" panose="020B0502040204020203" pitchFamily="34" charset="0"/>
+              </a:rPr>
+              <a:t>injects</a:t>
+            </a:r>
+            <a:r>
+              <a:rPr lang="de-DE" dirty="0">
+                <a:latin typeface="Bahnschrift" panose="020B0502040204020203" pitchFamily="34" charset="0"/>
+              </a:rPr>
+              <a:t> </a:t>
+            </a:r>
+            <a:r>
+              <a:rPr lang="de-DE" dirty="0" err="1">
+                <a:latin typeface="Bahnschrift" panose="020B0502040204020203" pitchFamily="34" charset="0"/>
+              </a:rPr>
+              <a:t>must</a:t>
+            </a:r>
+            <a:r>
+              <a:rPr lang="de-DE" dirty="0">
+                <a:latin typeface="Bahnschrift" panose="020B0502040204020203" pitchFamily="34" charset="0"/>
+              </a:rPr>
+              <a:t> </a:t>
+            </a:r>
+            <a:r>
+              <a:rPr lang="de-DE" dirty="0" err="1">
+                <a:latin typeface="Bahnschrift" panose="020B0502040204020203" pitchFamily="34" charset="0"/>
+              </a:rPr>
+              <a:t>have</a:t>
+            </a:r>
+            <a:r>
+              <a:rPr lang="de-DE" dirty="0">
+                <a:latin typeface="Bahnschrift" panose="020B0502040204020203" pitchFamily="34" charset="0"/>
+              </a:rPr>
+              <a:t> </a:t>
+            </a:r>
+            <a:r>
+              <a:rPr lang="de-DE" dirty="0" err="1">
+                <a:latin typeface="Bahnschrift" panose="020B0502040204020203" pitchFamily="34" charset="0"/>
+              </a:rPr>
+              <a:t>the</a:t>
+            </a:r>
+            <a:r>
+              <a:rPr lang="de-DE" dirty="0">
+                <a:latin typeface="Bahnschrift" panose="020B0502040204020203" pitchFamily="34" charset="0"/>
+              </a:rPr>
+              <a:t> </a:t>
+            </a:r>
+            <a:r>
+              <a:rPr lang="de-DE" dirty="0" err="1">
+                <a:latin typeface="Bahnschrift" panose="020B0502040204020203" pitchFamily="34" charset="0"/>
+              </a:rPr>
+              <a:t>default</a:t>
+            </a:r>
+            <a:r>
+              <a:rPr lang="de-DE" dirty="0">
+                <a:latin typeface="Bahnschrift" panose="020B0502040204020203" pitchFamily="34" charset="0"/>
+              </a:rPr>
+              <a:t> </a:t>
+            </a:r>
+            <a:r>
+              <a:rPr lang="de-DE" dirty="0" err="1">
+                <a:latin typeface="Bahnschrift" panose="020B0502040204020203" pitchFamily="34" charset="0"/>
+              </a:rPr>
+              <a:t>order</a:t>
+            </a:r>
+            <a:r>
+              <a:rPr lang="de-DE" dirty="0">
+                <a:latin typeface="Bahnschrift" panose="020B0502040204020203" pitchFamily="34" charset="0"/>
+              </a:rPr>
+              <a:t> </a:t>
+            </a:r>
+            <a:r>
+              <a:rPr lang="de-DE" dirty="0" err="1">
+                <a:latin typeface="Bahnschrift" panose="020B0502040204020203" pitchFamily="34" charset="0"/>
+              </a:rPr>
+              <a:t>of</a:t>
+            </a:r>
+            <a:r>
+              <a:rPr lang="de-DE" dirty="0">
+                <a:latin typeface="Bahnschrift" panose="020B0502040204020203" pitchFamily="34" charset="0"/>
+              </a:rPr>
+              <a:t> B</a:t>
+            </a:r>
+            <a:r>
+              <a:rPr lang="de-DE" i="1" dirty="0">
+                <a:latin typeface="Bahnschrift" panose="020B0502040204020203" pitchFamily="34" charset="0"/>
+              </a:rPr>
+              <a:t>udget </a:t>
             </a:r>
             <a:r>
               <a:rPr lang="de-DE" i="1" dirty="0" err="1">
                 <a:latin typeface="Bahnschrift" panose="020B0502040204020203" pitchFamily="34" charset="0"/>
               </a:rPr>
-              <a:t>choices</a:t>
-            </a:r>
-            <a:r>
-              <a:rPr lang="de-DE" dirty="0">
-                <a:latin typeface="Bahnschrift" panose="020B0502040204020203" pitchFamily="34" charset="0"/>
-              </a:rPr>
-              <a:t>, </a:t>
-            </a:r>
-            <a:r>
-              <a:rPr lang="de-DE" i="1" dirty="0" err="1">
-                <a:latin typeface="Bahnschrift" panose="020B0502040204020203" pitchFamily="34" charset="0"/>
-              </a:rPr>
-              <a:t>budget</a:t>
+              <a:t>Choices</a:t>
             </a:r>
             <a:r>
               <a:rPr lang="de-DE" i="1" dirty="0">
                 <a:latin typeface="Bahnschrift" panose="020B0502040204020203" pitchFamily="34" charset="0"/>
               </a:rPr>
-              <a:t> </a:t>
-            </a:r>
-            <a:r>
-              <a:rPr lang="de-DE" i="1" dirty="0" err="1">
-                <a:latin typeface="Bahnschrift" panose="020B0502040204020203" pitchFamily="34" charset="0"/>
-              </a:rPr>
-              <a:t>evaluation</a:t>
-            </a:r>
-            <a:r>
-              <a:rPr lang="de-DE" i="1" dirty="0">
-                <a:latin typeface="Bahnschrift" panose="020B0502040204020203" pitchFamily="34" charset="0"/>
-              </a:rPr>
-              <a:t> </a:t>
-            </a:r>
-            <a:r>
-              <a:rPr lang="de-DE" dirty="0">
-                <a:latin typeface="Bahnschrift" panose="020B0502040204020203" pitchFamily="34" charset="0"/>
-              </a:rPr>
-              <a:t>and </a:t>
-            </a:r>
-            <a:r>
-              <a:rPr lang="de-DE" i="1" dirty="0">
-                <a:latin typeface="Bahnschrift" panose="020B0502040204020203" pitchFamily="34" charset="0"/>
-              </a:rPr>
-              <a:t>final </a:t>
-            </a:r>
-            <a:r>
-              <a:rPr lang="de-DE" i="1" dirty="0" err="1">
-                <a:latin typeface="Bahnschrift" panose="020B0502040204020203" pitchFamily="34" charset="0"/>
-              </a:rPr>
-              <a:t>report</a:t>
-            </a:r>
-            <a:r>
-              <a:rPr lang="de-DE" dirty="0">
-                <a:latin typeface="Bahnschrift" panose="020B0502040204020203" pitchFamily="34" charset="0"/>
-              </a:rPr>
-              <a:t>. The </a:t>
-            </a:r>
-            <a:r>
-              <a:rPr lang="de-DE" dirty="0" err="1">
-                <a:latin typeface="Bahnschrift" panose="020B0502040204020203" pitchFamily="34" charset="0"/>
-              </a:rPr>
-              <a:t>injects</a:t>
-            </a:r>
-            <a:r>
-              <a:rPr lang="de-DE" dirty="0">
-                <a:latin typeface="Bahnschrift" panose="020B0502040204020203" pitchFamily="34" charset="0"/>
-              </a:rPr>
-              <a:t> </a:t>
-            </a:r>
-            <a:r>
-              <a:rPr lang="de-DE" dirty="0" err="1">
-                <a:latin typeface="Bahnschrift" panose="020B0502040204020203" pitchFamily="34" charset="0"/>
-              </a:rPr>
-              <a:t>must</a:t>
-            </a:r>
-            <a:r>
-              <a:rPr lang="de-DE" dirty="0">
-                <a:latin typeface="Bahnschrift" panose="020B0502040204020203" pitchFamily="34" charset="0"/>
-              </a:rPr>
-              <a:t> </a:t>
-            </a:r>
-            <a:r>
-              <a:rPr lang="de-DE" dirty="0" err="1">
-                <a:latin typeface="Bahnschrift" panose="020B0502040204020203" pitchFamily="34" charset="0"/>
-              </a:rPr>
-              <a:t>have</a:t>
-            </a:r>
-            <a:r>
-              <a:rPr lang="de-DE" dirty="0">
-                <a:latin typeface="Bahnschrift" panose="020B0502040204020203" pitchFamily="34" charset="0"/>
-              </a:rPr>
-              <a:t> </a:t>
-            </a:r>
-            <a:r>
-              <a:rPr lang="de-DE" dirty="0" err="1">
-                <a:latin typeface="Bahnschrift" panose="020B0502040204020203" pitchFamily="34" charset="0"/>
-              </a:rPr>
-              <a:t>the</a:t>
-            </a:r>
-            <a:r>
-              <a:rPr lang="de-DE" dirty="0">
-                <a:latin typeface="Bahnschrift" panose="020B0502040204020203" pitchFamily="34" charset="0"/>
-              </a:rPr>
-              <a:t> </a:t>
-            </a:r>
-            <a:r>
-              <a:rPr lang="de-DE" dirty="0" err="1">
-                <a:latin typeface="Bahnschrift" panose="020B0502040204020203" pitchFamily="34" charset="0"/>
-              </a:rPr>
-              <a:t>default</a:t>
-            </a:r>
-            <a:r>
-              <a:rPr lang="de-DE" dirty="0">
-                <a:latin typeface="Bahnschrift" panose="020B0502040204020203" pitchFamily="34" charset="0"/>
-              </a:rPr>
-              <a:t> </a:t>
-            </a:r>
-            <a:r>
-              <a:rPr lang="de-DE" dirty="0" err="1">
-                <a:latin typeface="Bahnschrift" panose="020B0502040204020203" pitchFamily="34" charset="0"/>
-              </a:rPr>
-              <a:t>order</a:t>
-            </a:r>
-            <a:r>
-              <a:rPr lang="de-DE" dirty="0">
-                <a:latin typeface="Bahnschrift" panose="020B0502040204020203" pitchFamily="34" charset="0"/>
-              </a:rPr>
-              <a:t> </a:t>
-            </a:r>
-            <a:r>
-              <a:rPr lang="de-DE" dirty="0" err="1">
-                <a:latin typeface="Bahnschrift" panose="020B0502040204020203" pitchFamily="34" charset="0"/>
-              </a:rPr>
-              <a:t>of</a:t>
-            </a:r>
-            <a:r>
-              <a:rPr lang="de-DE" dirty="0">
-                <a:latin typeface="Bahnschrift" panose="020B0502040204020203" pitchFamily="34" charset="0"/>
-              </a:rPr>
-              <a:t> </a:t>
-            </a:r>
-            <a:r>
-              <a:rPr lang="de-DE" i="1" dirty="0" err="1">
-                <a:latin typeface="Bahnschrift" panose="020B0502040204020203" pitchFamily="34" charset="0"/>
-              </a:rPr>
-              <a:t>budget</a:t>
-            </a:r>
-            <a:r>
-              <a:rPr lang="de-DE" i="1" dirty="0">
-                <a:latin typeface="Bahnschrift" panose="020B0502040204020203" pitchFamily="34" charset="0"/>
-              </a:rPr>
-              <a:t> </a:t>
-            </a:r>
-            <a:r>
-              <a:rPr lang="de-DE" i="1" dirty="0" err="1">
-                <a:latin typeface="Bahnschrift" panose="020B0502040204020203" pitchFamily="34" charset="0"/>
-              </a:rPr>
-              <a:t>choices</a:t>
-            </a:r>
-            <a:r>
-              <a:rPr lang="de-DE" i="1" dirty="0">
-                <a:latin typeface="Bahnschrift" panose="020B0502040204020203" pitchFamily="34" charset="0"/>
-              </a:rPr>
-              <a:t>, </a:t>
-            </a:r>
-            <a:r>
-              <a:rPr lang="de-DE" i="1" dirty="0" err="1">
-                <a:latin typeface="Bahnschrift" panose="020B0502040204020203" pitchFamily="34" charset="0"/>
-              </a:rPr>
-              <a:t>budget</a:t>
-            </a:r>
-            <a:r>
-              <a:rPr lang="de-DE" i="1" dirty="0">
-                <a:latin typeface="Bahnschrift" panose="020B0502040204020203" pitchFamily="34" charset="0"/>
-              </a:rPr>
-              <a:t> </a:t>
-            </a:r>
-            <a:r>
-              <a:rPr lang="de-DE" i="1" dirty="0" err="1">
-                <a:latin typeface="Bahnschrift" panose="020B0502040204020203" pitchFamily="34" charset="0"/>
-              </a:rPr>
-              <a:t>evaluation</a:t>
-            </a:r>
-            <a:r>
-              <a:rPr lang="de-DE" i="1" dirty="0">
-                <a:latin typeface="Bahnschrift" panose="020B0502040204020203" pitchFamily="34" charset="0"/>
-              </a:rPr>
-              <a:t>, final </a:t>
-            </a:r>
-            <a:r>
-              <a:rPr lang="de-DE" i="1" dirty="0" err="1">
-                <a:latin typeface="Bahnschrift" panose="020B0502040204020203" pitchFamily="34" charset="0"/>
-              </a:rPr>
-              <a:t>report</a:t>
+              <a:t>, Budget Evaluation, Final Report</a:t>
             </a:r>
             <a:r>
               <a:rPr lang="de-DE" dirty="0">
@@ -22430,10 +22513,16 @@
               <a:buNone/>
             </a:pPr>
             <a:r>
+              <a:rPr lang="de-DE" i="1" dirty="0">
+                <a:latin typeface="Bahnschrift" panose="020B0502040204020203" pitchFamily="34" charset="0"/>
+              </a:rPr>
+              <a:t>Budget </a:t>
+            </a:r>
+            <a:r>
               <a:rPr lang="de-DE" i="1" dirty="0" err="1">
                 <a:latin typeface="Bahnschrift" panose="020B0502040204020203" pitchFamily="34" charset="0"/>
               </a:rPr>
-              <a:t>Introduction</a:t>
+              <a:t>Choices</a:t>
             </a:r>
             <a:r>
               <a:rPr lang="de-DE" dirty="0">

</xml_diff>